<commit_message>
2 slides of results
</commit_message>
<xml_diff>
--- a/Presentation/presentation.pptx
+++ b/Presentation/presentation.pptx
@@ -3699,8 +3699,8 @@
         </p:nvSpPr>
         <p:spPr>
           <a:xfrm>
-            <a:off x="355600" y="660400"/>
-            <a:ext cx="12280900" cy="749300"/>
+            <a:off x="355600" y="637506"/>
+            <a:ext cx="12280900" cy="795089"/>
           </a:xfrm>
           <a:prstGeom prst="rect">
             <a:avLst/>
@@ -3740,13 +3740,256 @@
               </a:defRPr>
             </a:pPr>
             <a:r>
-              <a:rPr sz="4500">
+              <a:rPr lang="en-US" sz="4500" dirty="0" smtClean="0">
                 <a:solidFill>
                   <a:srgbClr val="B51A00"/>
                 </a:solidFill>
               </a:rPr>
-              <a:t>Anatomia: cuore e sistema di conduzione</a:t>
-            </a:r>
+              <a:t>Results</a:t>
+            </a:r>
+            <a:endParaRPr sz="4500" dirty="0">
+              <a:solidFill>
+                <a:srgbClr val="B51A00"/>
+              </a:solidFill>
+            </a:endParaRPr>
+          </a:p>
+        </p:txBody>
+      </p:sp>
+      <p:pic>
+        <p:nvPicPr>
+          <p:cNvPr id="2" name="Picture 1"/>
+          <p:cNvPicPr>
+            <a:picLocks noChangeAspect="1"/>
+          </p:cNvPicPr>
+          <p:nvPr/>
+        </p:nvPicPr>
+        <p:blipFill>
+          <a:blip r:embed="rId2">
+            <a:extLst>
+              <a:ext uri="{28A0092B-C50C-407E-A947-70E740481C1C}">
+                <a14:useLocalDpi xmlns:a14="http://schemas.microsoft.com/office/drawing/2010/main" val="0"/>
+              </a:ext>
+            </a:extLst>
+          </a:blip>
+          <a:stretch>
+            <a:fillRect/>
+          </a:stretch>
+        </p:blipFill>
+        <p:spPr>
+          <a:xfrm>
+            <a:off x="1364104" y="5779991"/>
+            <a:ext cx="10109101" cy="2343023"/>
+          </a:xfrm>
+          <a:prstGeom prst="rect">
+            <a:avLst/>
+          </a:prstGeom>
+        </p:spPr>
+      </p:pic>
+      <p:pic>
+        <p:nvPicPr>
+          <p:cNvPr id="4" name="Picture 3"/>
+          <p:cNvPicPr>
+            <a:picLocks noChangeAspect="1"/>
+          </p:cNvPicPr>
+          <p:nvPr/>
+        </p:nvPicPr>
+        <p:blipFill>
+          <a:blip r:embed="rId3">
+            <a:extLst>
+              <a:ext uri="{28A0092B-C50C-407E-A947-70E740481C1C}">
+                <a14:useLocalDpi xmlns:a14="http://schemas.microsoft.com/office/drawing/2010/main" val="0"/>
+              </a:ext>
+            </a:extLst>
+          </a:blip>
+          <a:stretch>
+            <a:fillRect/>
+          </a:stretch>
+        </p:blipFill>
+        <p:spPr>
+          <a:xfrm>
+            <a:off x="1364104" y="2214176"/>
+            <a:ext cx="10109101" cy="2873937"/>
+          </a:xfrm>
+          <a:prstGeom prst="rect">
+            <a:avLst/>
+          </a:prstGeom>
+        </p:spPr>
+      </p:pic>
+      <p:sp>
+        <p:nvSpPr>
+          <p:cNvPr id="5" name="TextBox 4"/>
+          <p:cNvSpPr txBox="1"/>
+          <p:nvPr/>
+        </p:nvSpPr>
+        <p:spPr>
+          <a:xfrm>
+            <a:off x="4115138" y="4889781"/>
+            <a:ext cx="4607030" cy="595035"/>
+          </a:xfrm>
+          <a:prstGeom prst="rect">
+            <a:avLst/>
+          </a:prstGeom>
+          <a:noFill/>
+          <a:ln w="12700" cap="flat">
+            <a:noFill/>
+            <a:miter lim="400000"/>
+          </a:ln>
+          <a:effectLst/>
+        </p:spPr>
+        <p:style>
+          <a:lnRef idx="0">
+            <a:scrgbClr r="0" g="0" b="0"/>
+          </a:lnRef>
+          <a:fillRef idx="0">
+            <a:scrgbClr r="0" g="0" b="0"/>
+          </a:fillRef>
+          <a:effectRef idx="0">
+            <a:scrgbClr r="0" g="0" b="0"/>
+          </a:effectRef>
+          <a:fontRef idx="none"/>
+        </p:style>
+        <p:txBody>
+          <a:bodyPr rot="0" spcFirstLastPara="1" vertOverflow="overflow" horzOverflow="overflow" vert="horz" wrap="none" lIns="50800" tIns="50800" rIns="50800" bIns="50800" numCol="1" spcCol="38100" rtlCol="0" anchor="ctr">
+            <a:spAutoFit/>
+          </a:bodyPr>
+          <a:lstStyle/>
+          <a:p>
+            <a:pPr marL="0" marR="0" indent="0" algn="ctr" defTabSz="584200" rtl="0" fontAlgn="auto" latinLnBrk="1" hangingPunct="0">
+              <a:lnSpc>
+                <a:spcPct val="100000"/>
+              </a:lnSpc>
+              <a:spcBef>
+                <a:spcPts val="0"/>
+              </a:spcBef>
+              <a:spcAft>
+                <a:spcPts val="0"/>
+              </a:spcAft>
+              <a:buClrTx/>
+              <a:buSzTx/>
+              <a:buFontTx/>
+              <a:buNone/>
+              <a:tabLst/>
+            </a:pPr>
+            <a:r>
+              <a:rPr kumimoji="0" lang="en-US" sz="3200" b="0" i="0" u="none" strike="noStrike" cap="none" spc="0" normalizeH="0" baseline="0" dirty="0" smtClean="0">
+                <a:ln>
+                  <a:noFill/>
+                </a:ln>
+                <a:solidFill>
+                  <a:srgbClr val="000000"/>
+                </a:solidFill>
+                <a:effectLst/>
+                <a:uFillTx/>
+                <a:latin typeface="+mn-lt"/>
+                <a:ea typeface="+mn-ea"/>
+                <a:cs typeface="+mn-cs"/>
+                <a:sym typeface="Gill Sans"/>
+              </a:rPr>
+              <a:t>Parameters manually tuned</a:t>
+            </a:r>
+            <a:endParaRPr kumimoji="0" lang="en-US" sz="3200" b="0" i="0" u="none" strike="noStrike" cap="none" spc="0" normalizeH="0" baseline="0" dirty="0">
+              <a:ln>
+                <a:noFill/>
+              </a:ln>
+              <a:solidFill>
+                <a:srgbClr val="000000"/>
+              </a:solidFill>
+              <a:effectLst/>
+              <a:uFillTx/>
+              <a:latin typeface="+mn-lt"/>
+              <a:ea typeface="+mn-ea"/>
+              <a:cs typeface="+mn-cs"/>
+              <a:sym typeface="Gill Sans"/>
+            </a:endParaRPr>
+          </a:p>
+        </p:txBody>
+      </p:sp>
+      <p:sp>
+        <p:nvSpPr>
+          <p:cNvPr id="6" name="TextBox 5"/>
+          <p:cNvSpPr txBox="1"/>
+          <p:nvPr/>
+        </p:nvSpPr>
+        <p:spPr>
+          <a:xfrm>
+            <a:off x="4466997" y="8020820"/>
+            <a:ext cx="3903313" cy="595035"/>
+          </a:xfrm>
+          <a:prstGeom prst="rect">
+            <a:avLst/>
+          </a:prstGeom>
+          <a:noFill/>
+          <a:ln w="12700" cap="flat">
+            <a:noFill/>
+            <a:miter lim="400000"/>
+          </a:ln>
+          <a:effectLst/>
+        </p:spPr>
+        <p:style>
+          <a:lnRef idx="0">
+            <a:scrgbClr r="0" g="0" b="0"/>
+          </a:lnRef>
+          <a:fillRef idx="0">
+            <a:scrgbClr r="0" g="0" b="0"/>
+          </a:fillRef>
+          <a:effectRef idx="0">
+            <a:scrgbClr r="0" g="0" b="0"/>
+          </a:effectRef>
+          <a:fontRef idx="none"/>
+        </p:style>
+        <p:txBody>
+          <a:bodyPr rot="0" spcFirstLastPara="1" vertOverflow="overflow" horzOverflow="overflow" vert="horz" wrap="none" lIns="50800" tIns="50800" rIns="50800" bIns="50800" numCol="1" spcCol="38100" rtlCol="0" anchor="ctr">
+            <a:spAutoFit/>
+          </a:bodyPr>
+          <a:lstStyle/>
+          <a:p>
+            <a:pPr marL="0" marR="0" indent="0" algn="ctr" defTabSz="584200" rtl="0" fontAlgn="auto" latinLnBrk="1" hangingPunct="0">
+              <a:lnSpc>
+                <a:spcPct val="100000"/>
+              </a:lnSpc>
+              <a:spcBef>
+                <a:spcPts val="0"/>
+              </a:spcBef>
+              <a:spcAft>
+                <a:spcPts val="0"/>
+              </a:spcAft>
+              <a:buClrTx/>
+              <a:buSzTx/>
+              <a:buFontTx/>
+              <a:buNone/>
+              <a:tabLst/>
+            </a:pPr>
+            <a:r>
+              <a:rPr kumimoji="0" lang="en-US" sz="3200" b="0" i="0" u="none" strike="noStrike" cap="none" spc="0" normalizeH="0" baseline="0" dirty="0" smtClean="0">
+                <a:ln>
+                  <a:noFill/>
+                </a:ln>
+                <a:solidFill>
+                  <a:srgbClr val="000000"/>
+                </a:solidFill>
+                <a:effectLst/>
+                <a:uFillTx/>
+                <a:latin typeface="+mn-lt"/>
+                <a:ea typeface="+mn-ea"/>
+                <a:cs typeface="+mn-cs"/>
+                <a:sym typeface="Gill Sans"/>
+              </a:rPr>
+              <a:t>Weights found by PSO</a:t>
+            </a:r>
+            <a:endParaRPr kumimoji="0" lang="en-US" sz="3200" b="0" i="0" u="none" strike="noStrike" cap="none" spc="0" normalizeH="0" baseline="0" dirty="0">
+              <a:ln>
+                <a:noFill/>
+              </a:ln>
+              <a:solidFill>
+                <a:srgbClr val="000000"/>
+              </a:solidFill>
+              <a:effectLst/>
+              <a:uFillTx/>
+              <a:latin typeface="+mn-lt"/>
+              <a:ea typeface="+mn-ea"/>
+              <a:cs typeface="+mn-cs"/>
+              <a:sym typeface="Gill Sans"/>
+            </a:endParaRPr>
           </a:p>
         </p:txBody>
       </p:sp>
@@ -12247,20 +12490,23 @@
           </a:p>
           <a:p>
             <a:pPr lvl="1" indent="0" algn="l" rtl="0" latinLnBrk="1" hangingPunct="0"/>
-            <a:endParaRPr kumimoji="0" lang="en-US" b="0" i="0" u="none" strike="noStrike" cap="none" spc="0" normalizeH="0" baseline="0" dirty="0" smtClean="0">
-              <a:ln>
-                <a:noFill/>
-              </a:ln>
-              <a:solidFill>
-                <a:srgbClr val="000000"/>
-              </a:solidFill>
-              <a:effectLst/>
-              <a:uFillTx/>
-              <a:latin typeface="+mn-lt"/>
-              <a:ea typeface="+mn-ea"/>
-              <a:cs typeface="+mn-cs"/>
-              <a:sym typeface="Gill Sans"/>
-            </a:endParaRPr>
+            <a:r>
+              <a:rPr kumimoji="0" lang="en-US" b="0" i="0" u="none" strike="noStrike" cap="none" spc="0" normalizeH="0" baseline="0" dirty="0" smtClean="0">
+                <a:ln>
+                  <a:noFill/>
+                </a:ln>
+                <a:solidFill>
+                  <a:srgbClr val="000000"/>
+                </a:solidFill>
+                <a:effectLst/>
+                <a:uFillTx/>
+                <a:latin typeface="+mn-lt"/>
+                <a:ea typeface="+mn-ea"/>
+                <a:cs typeface="+mn-cs"/>
+                <a:sym typeface="Gill Sans"/>
+              </a:rPr>
+              <a:t>	- 4 chosen parameters</a:t>
+            </a:r>
           </a:p>
           <a:p>
             <a:pPr marL="571500" marR="0" indent="-571500" algn="l" defTabSz="584200" rtl="0" fontAlgn="auto" latinLnBrk="1" hangingPunct="0">
@@ -13219,8 +13465,8 @@
         </p:nvSpPr>
         <p:spPr>
           <a:xfrm>
-            <a:off x="355600" y="660400"/>
-            <a:ext cx="12280900" cy="749300"/>
+            <a:off x="355600" y="637506"/>
+            <a:ext cx="12280900" cy="795089"/>
           </a:xfrm>
           <a:prstGeom prst="rect">
             <a:avLst/>
@@ -13260,13 +13506,488 @@
               </a:defRPr>
             </a:pPr>
             <a:r>
-              <a:rPr sz="4500">
+              <a:rPr lang="en-US" sz="4500" dirty="0" smtClean="0">
                 <a:solidFill>
                   <a:srgbClr val="B51A00"/>
                 </a:solidFill>
               </a:rPr>
-              <a:t>Anatomia: cuore e sistema di conduzione</a:t>
-            </a:r>
+              <a:t>Results</a:t>
+            </a:r>
+            <a:endParaRPr sz="4500" dirty="0">
+              <a:solidFill>
+                <a:srgbClr val="B51A00"/>
+              </a:solidFill>
+            </a:endParaRPr>
+          </a:p>
+        </p:txBody>
+      </p:sp>
+      <p:sp>
+        <p:nvSpPr>
+          <p:cNvPr id="3" name="TextBox 2"/>
+          <p:cNvSpPr txBox="1"/>
+          <p:nvPr/>
+        </p:nvSpPr>
+        <p:spPr>
+          <a:xfrm>
+            <a:off x="2497358" y="1939866"/>
+            <a:ext cx="7997382" cy="748923"/>
+          </a:xfrm>
+          <a:prstGeom prst="rect">
+            <a:avLst/>
+          </a:prstGeom>
+          <a:noFill/>
+          <a:ln w="12700" cap="flat">
+            <a:noFill/>
+            <a:miter lim="400000"/>
+          </a:ln>
+          <a:effectLst/>
+        </p:spPr>
+        <p:style>
+          <a:lnRef idx="0">
+            <a:scrgbClr r="0" g="0" b="0"/>
+          </a:lnRef>
+          <a:fillRef idx="0">
+            <a:scrgbClr r="0" g="0" b="0"/>
+          </a:fillRef>
+          <a:effectRef idx="0">
+            <a:scrgbClr r="0" g="0" b="0"/>
+          </a:effectRef>
+          <a:fontRef idx="none"/>
+        </p:style>
+        <p:txBody>
+          <a:bodyPr rot="0" spcFirstLastPara="1" vertOverflow="overflow" horzOverflow="overflow" vert="horz" wrap="none" lIns="50800" tIns="50800" rIns="50800" bIns="50800" numCol="1" spcCol="38100" rtlCol="0" anchor="ctr">
+            <a:spAutoFit/>
+          </a:bodyPr>
+          <a:lstStyle/>
+          <a:p>
+            <a:pPr marL="0" marR="0" indent="0" algn="ctr" defTabSz="584200" rtl="0" fontAlgn="auto" latinLnBrk="1" hangingPunct="0">
+              <a:lnSpc>
+                <a:spcPct val="100000"/>
+              </a:lnSpc>
+              <a:spcBef>
+                <a:spcPts val="0"/>
+              </a:spcBef>
+              <a:spcAft>
+                <a:spcPts val="0"/>
+              </a:spcAft>
+              <a:buClrTx/>
+              <a:buSzTx/>
+              <a:buFontTx/>
+              <a:buNone/>
+              <a:tabLst/>
+            </a:pPr>
+            <a:r>
+              <a:rPr kumimoji="0" lang="en-US" sz="4200" b="0" i="0" u="none" strike="noStrike" cap="none" spc="0" normalizeH="0" baseline="0" dirty="0" smtClean="0">
+                <a:ln>
+                  <a:noFill/>
+                </a:ln>
+                <a:solidFill>
+                  <a:srgbClr val="000000"/>
+                </a:solidFill>
+                <a:effectLst/>
+                <a:uFillTx/>
+                <a:latin typeface="+mn-lt"/>
+                <a:ea typeface="+mn-ea"/>
+                <a:cs typeface="+mn-cs"/>
+                <a:sym typeface="Gill Sans"/>
+              </a:rPr>
+              <a:t>3 different worlds </a:t>
+            </a:r>
+            <a:r>
+              <a:rPr kumimoji="0" lang="en-US" sz="4200" b="0" i="0" u="none" strike="noStrike" cap="none" spc="0" normalizeH="0" baseline="0" dirty="0" err="1" smtClean="0">
+                <a:ln>
+                  <a:noFill/>
+                </a:ln>
+                <a:solidFill>
+                  <a:srgbClr val="000000"/>
+                </a:solidFill>
+                <a:effectLst/>
+                <a:uFillTx/>
+                <a:latin typeface="+mn-lt"/>
+                <a:ea typeface="+mn-ea"/>
+                <a:cs typeface="+mn-cs"/>
+                <a:sym typeface="Gill Sans"/>
+              </a:rPr>
+              <a:t>consided</a:t>
+            </a:r>
+            <a:r>
+              <a:rPr kumimoji="0" lang="en-US" sz="4200" b="0" i="0" u="none" strike="noStrike" cap="none" spc="0" normalizeH="0" baseline="0" dirty="0" smtClean="0">
+                <a:ln>
+                  <a:noFill/>
+                </a:ln>
+                <a:solidFill>
+                  <a:srgbClr val="000000"/>
+                </a:solidFill>
+                <a:effectLst/>
+                <a:uFillTx/>
+                <a:latin typeface="+mn-lt"/>
+                <a:ea typeface="+mn-ea"/>
+                <a:cs typeface="+mn-cs"/>
+                <a:sym typeface="Gill Sans"/>
+              </a:rPr>
+              <a:t> for PSO</a:t>
+            </a:r>
+            <a:endParaRPr kumimoji="0" lang="en-US" sz="4200" b="0" i="0" u="none" strike="noStrike" cap="none" spc="0" normalizeH="0" baseline="0" dirty="0">
+              <a:ln>
+                <a:noFill/>
+              </a:ln>
+              <a:solidFill>
+                <a:srgbClr val="000000"/>
+              </a:solidFill>
+              <a:effectLst/>
+              <a:uFillTx/>
+              <a:latin typeface="+mn-lt"/>
+              <a:ea typeface="+mn-ea"/>
+              <a:cs typeface="+mn-cs"/>
+              <a:sym typeface="Gill Sans"/>
+            </a:endParaRPr>
+          </a:p>
+        </p:txBody>
+      </p:sp>
+      <p:pic>
+        <p:nvPicPr>
+          <p:cNvPr id="5" name="Picture 4"/>
+          <p:cNvPicPr>
+            <a:picLocks noChangeAspect="1"/>
+          </p:cNvPicPr>
+          <p:nvPr/>
+        </p:nvPicPr>
+        <p:blipFill>
+          <a:blip r:embed="rId2">
+            <a:extLst>
+              <a:ext uri="{28A0092B-C50C-407E-A947-70E740481C1C}">
+                <a14:useLocalDpi xmlns:a14="http://schemas.microsoft.com/office/drawing/2010/main" val="0"/>
+              </a:ext>
+            </a:extLst>
+          </a:blip>
+          <a:stretch>
+            <a:fillRect/>
+          </a:stretch>
+        </p:blipFill>
+        <p:spPr>
+          <a:xfrm>
+            <a:off x="1320434" y="2767904"/>
+            <a:ext cx="10351230" cy="5175615"/>
+          </a:xfrm>
+          <a:prstGeom prst="rect">
+            <a:avLst/>
+          </a:prstGeom>
+        </p:spPr>
+      </p:pic>
+      <p:sp>
+        <p:nvSpPr>
+          <p:cNvPr id="6" name="TextBox 5"/>
+          <p:cNvSpPr txBox="1"/>
+          <p:nvPr/>
+        </p:nvSpPr>
+        <p:spPr>
+          <a:xfrm>
+            <a:off x="1964321" y="8101748"/>
+            <a:ext cx="1668727" cy="533479"/>
+          </a:xfrm>
+          <a:prstGeom prst="rect">
+            <a:avLst/>
+          </a:prstGeom>
+          <a:noFill/>
+          <a:ln w="12700" cap="flat">
+            <a:noFill/>
+            <a:miter lim="400000"/>
+          </a:ln>
+          <a:effectLst/>
+        </p:spPr>
+        <p:style>
+          <a:lnRef idx="0">
+            <a:scrgbClr r="0" g="0" b="0"/>
+          </a:lnRef>
+          <a:fillRef idx="0">
+            <a:scrgbClr r="0" g="0" b="0"/>
+          </a:fillRef>
+          <a:effectRef idx="0">
+            <a:scrgbClr r="0" g="0" b="0"/>
+          </a:effectRef>
+          <a:fontRef idx="none"/>
+        </p:style>
+        <p:txBody>
+          <a:bodyPr rot="0" spcFirstLastPara="1" vertOverflow="overflow" horzOverflow="overflow" vert="horz" wrap="none" lIns="50800" tIns="50800" rIns="50800" bIns="50800" numCol="1" spcCol="38100" rtlCol="0" anchor="ctr">
+            <a:spAutoFit/>
+          </a:bodyPr>
+          <a:lstStyle/>
+          <a:p>
+            <a:pPr marL="0" marR="0" indent="0" algn="ctr" defTabSz="584200" rtl="0" fontAlgn="auto" latinLnBrk="1" hangingPunct="0">
+              <a:lnSpc>
+                <a:spcPct val="100000"/>
+              </a:lnSpc>
+              <a:spcBef>
+                <a:spcPts val="0"/>
+              </a:spcBef>
+              <a:spcAft>
+                <a:spcPts val="0"/>
+              </a:spcAft>
+              <a:buClrTx/>
+              <a:buSzTx/>
+              <a:buFontTx/>
+              <a:buNone/>
+              <a:tabLst/>
+            </a:pPr>
+            <a:r>
+              <a:rPr lang="en-US" sz="2800" dirty="0" smtClean="0">
+                <a:solidFill>
+                  <a:srgbClr val="000000"/>
+                </a:solidFill>
+              </a:rPr>
+              <a:t>1</a:t>
+            </a:r>
+            <a:r>
+              <a:rPr lang="en-US" sz="2800" dirty="0">
+                <a:solidFill>
+                  <a:srgbClr val="000000"/>
+                </a:solidFill>
+              </a:rPr>
+              <a:t>.</a:t>
+            </a:r>
+            <a:r>
+              <a:rPr kumimoji="0" lang="en-US" sz="2800" b="0" i="0" u="none" strike="noStrike" cap="none" spc="0" normalizeH="0" baseline="0" dirty="0" smtClean="0">
+                <a:ln>
+                  <a:noFill/>
+                </a:ln>
+                <a:solidFill>
+                  <a:srgbClr val="000000"/>
+                </a:solidFill>
+                <a:effectLst/>
+                <a:uFillTx/>
+                <a:sym typeface="Gill Sans"/>
+              </a:rPr>
+              <a:t> Random</a:t>
+            </a:r>
+            <a:endParaRPr kumimoji="0" lang="en-US" sz="2800" b="0" i="0" u="none" strike="noStrike" cap="none" spc="0" normalizeH="0" baseline="0" dirty="0">
+              <a:ln>
+                <a:noFill/>
+              </a:ln>
+              <a:solidFill>
+                <a:srgbClr val="000000"/>
+              </a:solidFill>
+              <a:effectLst/>
+              <a:uFillTx/>
+              <a:sym typeface="Gill Sans"/>
+            </a:endParaRPr>
+          </a:p>
+        </p:txBody>
+      </p:sp>
+      <p:sp>
+        <p:nvSpPr>
+          <p:cNvPr id="18" name="TextBox 17"/>
+          <p:cNvSpPr txBox="1"/>
+          <p:nvPr/>
+        </p:nvSpPr>
+        <p:spPr>
+          <a:xfrm>
+            <a:off x="4675921" y="8101748"/>
+            <a:ext cx="2967158" cy="533479"/>
+          </a:xfrm>
+          <a:prstGeom prst="rect">
+            <a:avLst/>
+          </a:prstGeom>
+          <a:noFill/>
+          <a:ln w="12700" cap="flat">
+            <a:noFill/>
+            <a:miter lim="400000"/>
+          </a:ln>
+          <a:effectLst/>
+        </p:spPr>
+        <p:style>
+          <a:lnRef idx="0">
+            <a:scrgbClr r="0" g="0" b="0"/>
+          </a:lnRef>
+          <a:fillRef idx="0">
+            <a:scrgbClr r="0" g="0" b="0"/>
+          </a:fillRef>
+          <a:effectRef idx="0">
+            <a:scrgbClr r="0" g="0" b="0"/>
+          </a:effectRef>
+          <a:fontRef idx="none"/>
+        </p:style>
+        <p:txBody>
+          <a:bodyPr rot="0" spcFirstLastPara="1" vertOverflow="overflow" horzOverflow="overflow" vert="horz" wrap="none" lIns="50800" tIns="50800" rIns="50800" bIns="50800" numCol="1" spcCol="38100" rtlCol="0" anchor="ctr">
+            <a:spAutoFit/>
+          </a:bodyPr>
+          <a:lstStyle/>
+          <a:p>
+            <a:pPr marL="0" marR="0" indent="0" algn="ctr" defTabSz="584200" rtl="0" fontAlgn="auto" latinLnBrk="1" hangingPunct="0">
+              <a:lnSpc>
+                <a:spcPct val="100000"/>
+              </a:lnSpc>
+              <a:spcBef>
+                <a:spcPts val="0"/>
+              </a:spcBef>
+              <a:spcAft>
+                <a:spcPts val="0"/>
+              </a:spcAft>
+              <a:buClrTx/>
+              <a:buSzTx/>
+              <a:buFontTx/>
+              <a:buNone/>
+              <a:tabLst/>
+            </a:pPr>
+            <a:r>
+              <a:rPr lang="en-US" sz="2800" dirty="0" smtClean="0">
+                <a:solidFill>
+                  <a:srgbClr val="000000"/>
+                </a:solidFill>
+              </a:rPr>
+              <a:t>2</a:t>
+            </a:r>
+            <a:r>
+              <a:rPr lang="en-US" sz="2800" dirty="0">
+                <a:solidFill>
+                  <a:srgbClr val="000000"/>
+                </a:solidFill>
+              </a:rPr>
+              <a:t>.</a:t>
+            </a:r>
+            <a:r>
+              <a:rPr kumimoji="0" lang="en-US" sz="2800" b="0" i="0" u="none" strike="noStrike" cap="none" spc="0" normalizeH="0" baseline="0" dirty="0" smtClean="0">
+                <a:ln>
+                  <a:noFill/>
+                </a:ln>
+                <a:solidFill>
+                  <a:srgbClr val="000000"/>
+                </a:solidFill>
+                <a:effectLst/>
+                <a:uFillTx/>
+                <a:sym typeface="Gill Sans"/>
+              </a:rPr>
+              <a:t> Wall of obstacles</a:t>
+            </a:r>
+            <a:endParaRPr kumimoji="0" lang="en-US" sz="2800" b="0" i="0" u="none" strike="noStrike" cap="none" spc="0" normalizeH="0" baseline="0" dirty="0">
+              <a:ln>
+                <a:noFill/>
+              </a:ln>
+              <a:solidFill>
+                <a:srgbClr val="000000"/>
+              </a:solidFill>
+              <a:effectLst/>
+              <a:uFillTx/>
+              <a:sym typeface="Gill Sans"/>
+            </a:endParaRPr>
+          </a:p>
+        </p:txBody>
+      </p:sp>
+      <p:sp>
+        <p:nvSpPr>
+          <p:cNvPr id="19" name="TextBox 18"/>
+          <p:cNvSpPr txBox="1"/>
+          <p:nvPr/>
+        </p:nvSpPr>
+        <p:spPr>
+          <a:xfrm>
+            <a:off x="8060098" y="8101748"/>
+            <a:ext cx="3611566" cy="533479"/>
+          </a:xfrm>
+          <a:prstGeom prst="rect">
+            <a:avLst/>
+          </a:prstGeom>
+          <a:noFill/>
+          <a:ln w="12700" cap="flat">
+            <a:noFill/>
+            <a:miter lim="400000"/>
+          </a:ln>
+          <a:effectLst/>
+        </p:spPr>
+        <p:style>
+          <a:lnRef idx="0">
+            <a:scrgbClr r="0" g="0" b="0"/>
+          </a:lnRef>
+          <a:fillRef idx="0">
+            <a:scrgbClr r="0" g="0" b="0"/>
+          </a:fillRef>
+          <a:effectRef idx="0">
+            <a:scrgbClr r="0" g="0" b="0"/>
+          </a:effectRef>
+          <a:fontRef idx="none"/>
+        </p:style>
+        <p:txBody>
+          <a:bodyPr rot="0" spcFirstLastPara="1" vertOverflow="overflow" horzOverflow="overflow" vert="horz" wrap="none" lIns="50800" tIns="50800" rIns="50800" bIns="50800" numCol="1" spcCol="38100" rtlCol="0" anchor="ctr">
+            <a:spAutoFit/>
+          </a:bodyPr>
+          <a:lstStyle/>
+          <a:p>
+            <a:pPr marL="0" marR="0" indent="0" algn="ctr" defTabSz="584200" rtl="0" fontAlgn="auto" latinLnBrk="1" hangingPunct="0">
+              <a:lnSpc>
+                <a:spcPct val="100000"/>
+              </a:lnSpc>
+              <a:spcBef>
+                <a:spcPts val="0"/>
+              </a:spcBef>
+              <a:spcAft>
+                <a:spcPts val="0"/>
+              </a:spcAft>
+              <a:buClrTx/>
+              <a:buSzTx/>
+              <a:buFontTx/>
+              <a:buNone/>
+              <a:tabLst/>
+            </a:pPr>
+            <a:r>
+              <a:rPr kumimoji="0" lang="en-US" sz="2800" b="0" i="0" u="none" strike="noStrike" cap="none" spc="0" normalizeH="0" baseline="0" dirty="0" smtClean="0">
+                <a:ln>
+                  <a:noFill/>
+                </a:ln>
+                <a:solidFill>
+                  <a:srgbClr val="000000"/>
+                </a:solidFill>
+                <a:effectLst/>
+                <a:uFillTx/>
+                <a:sym typeface="Gill Sans"/>
+              </a:rPr>
+              <a:t>3.</a:t>
+            </a:r>
+            <a:r>
+              <a:rPr kumimoji="0" lang="en-US" sz="2800" b="0" i="0" u="none" strike="noStrike" cap="none" spc="0" normalizeH="0" dirty="0" smtClean="0">
+                <a:ln>
+                  <a:noFill/>
+                </a:ln>
+                <a:solidFill>
+                  <a:srgbClr val="000000"/>
+                </a:solidFill>
+                <a:effectLst/>
+                <a:uFillTx/>
+                <a:sym typeface="Gill Sans"/>
+              </a:rPr>
+              <a:t> </a:t>
+            </a:r>
+            <a:r>
+              <a:rPr lang="en-US" sz="2800" dirty="0" smtClean="0">
+                <a:solidFill>
+                  <a:srgbClr val="000000"/>
+                </a:solidFill>
+              </a:rPr>
+              <a:t>D</a:t>
+            </a:r>
+            <a:r>
+              <a:rPr kumimoji="0" lang="en-US" sz="2800" b="0" i="0" u="none" strike="noStrike" cap="none" spc="0" normalizeH="0" baseline="0" dirty="0" smtClean="0">
+                <a:ln>
+                  <a:noFill/>
+                </a:ln>
+                <a:solidFill>
+                  <a:srgbClr val="000000"/>
+                </a:solidFill>
+                <a:effectLst/>
+                <a:uFillTx/>
+                <a:sym typeface="Gill Sans"/>
+              </a:rPr>
+              <a:t>ifficult configuration</a:t>
+            </a:r>
+            <a:endParaRPr kumimoji="0" lang="en-US" sz="2800" b="0" i="0" u="none" strike="noStrike" cap="none" spc="0" normalizeH="0" baseline="0" dirty="0">
+              <a:ln>
+                <a:noFill/>
+              </a:ln>
+              <a:solidFill>
+                <a:srgbClr val="000000"/>
+              </a:solidFill>
+              <a:effectLst/>
+              <a:uFillTx/>
+              <a:sym typeface="Gill Sans"/>
+            </a:endParaRPr>
           </a:p>
         </p:txBody>
       </p:sp>

</xml_diff>